<commit_message>
Add vibe coding process guide HTML
</commit_message>
<xml_diff>
--- a/apm_price_direct.pptx
+++ b/apm_price_direct.pptx
@@ -7,7 +7,7 @@
   <p:sldIdLst>
     <p:sldId id="256" r:id="rId7"/>
   </p:sldIdLst>
-  <p:sldSz cx="12188952" cy="6858000" type="screen4x3"/>
+  <p:sldSz cx="10689336" cy="7562088" type="screen4x3"/>
   <p:notesSz cx="6858000" cy="9144000"/>
   <p:defaultTextStyle>
     <a:defPPr>
@@ -3104,8 +3104,8 @@
         </p:blipFill>
         <p:spPr>
           <a:xfrm>
-            <a:off x="0" y="0"/>
-            <a:ext cx="12188952" cy="6858000"/>
+            <a:off x="0" y="-420"/>
+            <a:ext cx="10689336" cy="7562928"/>
           </a:xfrm>
           <a:prstGeom prst="rect">
             <a:avLst/>

</xml_diff>